<commit_message>
Added why and how to initial concept
</commit_message>
<xml_diff>
--- a/docs/Final presentation.pptx
+++ b/docs/Final presentation.pptx
@@ -113,6 +113,14 @@
       </a:defRPr>
     </a:lvl9pPr>
   </p:defaultTextStyle>
+  <p:extLst>
+    <p:ext uri="{EFAFB233-063F-42B5-8137-9DF3F51BA10A}">
+      <p15:sldGuideLst xmlns:p15="http://schemas.microsoft.com/office/powerpoint/2012/main"/>
+    </p:ext>
+    <p:ext uri="{2D200454-40CA-4A62-9FC3-DE9A4176ACB9}">
+      <p15:notesGuideLst xmlns:p15="http://schemas.microsoft.com/office/powerpoint/2012/main"/>
+    </p:ext>
+  </p:extLst>
 </p:presentation>
 </file>
 
@@ -210,7 +218,7 @@
           <a:p>
             <a:fld id="{6316BC88-D4A5-4B77-BFF4-9C16B0CF3448}" type="datetimeFigureOut">
               <a:rPr lang="en-NL" smtClean="0"/>
-              <a:t>04/05/2025</a:t>
+              <a:t>08/05/2025</a:t>
             </a:fld>
             <a:endParaRPr lang="en-NL"/>
           </a:p>
@@ -387,7 +395,7 @@
           <a:p>
             <a:fld id="{CDCB2732-F640-41F9-8573-320D68CC452C}" type="datetimeFigureOut">
               <a:rPr lang="en-NL" smtClean="0"/>
-              <a:t>04/05/2025</a:t>
+              <a:t>08/05/2025</a:t>
             </a:fld>
             <a:endParaRPr lang="en-NL"/>
           </a:p>
@@ -785,7 +793,7 @@
           <a:p>
             <a:r>
               <a:rPr lang="en-US" dirty="0"/>
-              <a:t>Problems:</a:t>
+              <a:t>Problems: The problems we chose were based on the SDG’s 9/11 and our aim was to present our research of the innerworkings of Autonomous systems and Digital twin together with the SDG’s</a:t>
             </a:r>
           </a:p>
           <a:p>
@@ -1014,7 +1022,7 @@
           <a:p>
             <a:fld id="{458A7759-45BD-4C8B-82B7-07C4A55C7C0F}" type="datetimeFigureOut">
               <a:rPr lang="en-NL" smtClean="0"/>
-              <a:t>04/05/2025</a:t>
+              <a:t>08/05/2025</a:t>
             </a:fld>
             <a:endParaRPr lang="en-NL"/>
           </a:p>
@@ -1320,7 +1328,7 @@
           <a:p>
             <a:fld id="{458A7759-45BD-4C8B-82B7-07C4A55C7C0F}" type="datetimeFigureOut">
               <a:rPr lang="en-NL" smtClean="0"/>
-              <a:t>04/05/2025</a:t>
+              <a:t>08/05/2025</a:t>
             </a:fld>
             <a:endParaRPr lang="en-NL"/>
           </a:p>
@@ -1530,7 +1538,7 @@
           <a:p>
             <a:fld id="{458A7759-45BD-4C8B-82B7-07C4A55C7C0F}" type="datetimeFigureOut">
               <a:rPr lang="en-NL" smtClean="0"/>
-              <a:t>04/05/2025</a:t>
+              <a:t>08/05/2025</a:t>
             </a:fld>
             <a:endParaRPr lang="en-NL"/>
           </a:p>
@@ -1730,7 +1738,7 @@
           <a:p>
             <a:fld id="{458A7759-45BD-4C8B-82B7-07C4A55C7C0F}" type="datetimeFigureOut">
               <a:rPr lang="en-NL" smtClean="0"/>
-              <a:t>04/05/2025</a:t>
+              <a:t>08/05/2025</a:t>
             </a:fld>
             <a:endParaRPr lang="en-NL"/>
           </a:p>
@@ -2006,7 +2014,7 @@
           <a:p>
             <a:fld id="{458A7759-45BD-4C8B-82B7-07C4A55C7C0F}" type="datetimeFigureOut">
               <a:rPr lang="en-NL" smtClean="0"/>
-              <a:t>04/05/2025</a:t>
+              <a:t>08/05/2025</a:t>
             </a:fld>
             <a:endParaRPr lang="en-NL"/>
           </a:p>
@@ -2274,7 +2282,7 @@
           <a:p>
             <a:fld id="{458A7759-45BD-4C8B-82B7-07C4A55C7C0F}" type="datetimeFigureOut">
               <a:rPr lang="en-NL" smtClean="0"/>
-              <a:t>04/05/2025</a:t>
+              <a:t>08/05/2025</a:t>
             </a:fld>
             <a:endParaRPr lang="en-NL"/>
           </a:p>
@@ -2689,7 +2697,7 @@
           <a:p>
             <a:fld id="{458A7759-45BD-4C8B-82B7-07C4A55C7C0F}" type="datetimeFigureOut">
               <a:rPr lang="en-NL" smtClean="0"/>
-              <a:t>04/05/2025</a:t>
+              <a:t>08/05/2025</a:t>
             </a:fld>
             <a:endParaRPr lang="en-NL"/>
           </a:p>
@@ -2831,7 +2839,7 @@
           <a:p>
             <a:fld id="{458A7759-45BD-4C8B-82B7-07C4A55C7C0F}" type="datetimeFigureOut">
               <a:rPr lang="en-NL" smtClean="0"/>
-              <a:t>04/05/2025</a:t>
+              <a:t>08/05/2025</a:t>
             </a:fld>
             <a:endParaRPr lang="en-NL"/>
           </a:p>
@@ -2944,7 +2952,7 @@
           <a:p>
             <a:fld id="{458A7759-45BD-4C8B-82B7-07C4A55C7C0F}" type="datetimeFigureOut">
               <a:rPr lang="en-NL" smtClean="0"/>
-              <a:t>04/05/2025</a:t>
+              <a:t>08/05/2025</a:t>
             </a:fld>
             <a:endParaRPr lang="en-NL"/>
           </a:p>
@@ -3257,7 +3265,7 @@
           <a:p>
             <a:fld id="{458A7759-45BD-4C8B-82B7-07C4A55C7C0F}" type="datetimeFigureOut">
               <a:rPr lang="en-NL" smtClean="0"/>
-              <a:t>04/05/2025</a:t>
+              <a:t>08/05/2025</a:t>
             </a:fld>
             <a:endParaRPr lang="en-NL"/>
           </a:p>
@@ -3546,7 +3554,7 @@
           <a:p>
             <a:fld id="{458A7759-45BD-4C8B-82B7-07C4A55C7C0F}" type="datetimeFigureOut">
               <a:rPr lang="en-NL" smtClean="0"/>
-              <a:t>04/05/2025</a:t>
+              <a:t>08/05/2025</a:t>
             </a:fld>
             <a:endParaRPr lang="en-NL"/>
           </a:p>
@@ -3789,7 +3797,7 @@
           <a:p>
             <a:fld id="{458A7759-45BD-4C8B-82B7-07C4A55C7C0F}" type="datetimeFigureOut">
               <a:rPr lang="en-NL" smtClean="0"/>
-              <a:t>04/05/2025</a:t>
+              <a:t>08/05/2025</a:t>
             </a:fld>
             <a:endParaRPr lang="en-NL"/>
           </a:p>

</xml_diff>